<commit_message>
Refactor Config Conformance Pack Solution Issue #28
</commit_message>
<xml_diff>
--- a/solutions/config/conformance-pack-org/documentation/diagram/AWS-Config-Organization-Rules-Architecture.pptx
+++ b/solutions/config/conformance-pack-org/documentation/diagram/AWS-Config-Organization-Rules-Architecture.pptx
@@ -197,7 +197,7 @@
           <a:p>
             <a:fld id="{FD8D84E3-00BA-4A46-8256-7E527D8B4480}" type="datetimeFigureOut">
               <a:rPr lang="en-US" smtClean="0"/>
-              <a:t>9/10/20</a:t>
+              <a:t>5/27/21</a:t>
             </a:fld>
             <a:endParaRPr lang="en-US"/>
           </a:p>
@@ -695,7 +695,7 @@
           <a:p>
             <a:fld id="{9FE185F7-9B28-9F45-9F43-9CB5A0B99390}" type="datetimeFigureOut">
               <a:rPr lang="en-US" smtClean="0"/>
-              <a:t>9/10/20</a:t>
+              <a:t>5/27/21</a:t>
             </a:fld>
             <a:endParaRPr lang="en-US"/>
           </a:p>
@@ -893,7 +893,7 @@
           <a:p>
             <a:fld id="{9FE185F7-9B28-9F45-9F43-9CB5A0B99390}" type="datetimeFigureOut">
               <a:rPr lang="en-US" smtClean="0"/>
-              <a:t>9/10/20</a:t>
+              <a:t>5/27/21</a:t>
             </a:fld>
             <a:endParaRPr lang="en-US"/>
           </a:p>
@@ -1101,7 +1101,7 @@
           <a:p>
             <a:fld id="{9FE185F7-9B28-9F45-9F43-9CB5A0B99390}" type="datetimeFigureOut">
               <a:rPr lang="en-US" smtClean="0"/>
-              <a:t>9/10/20</a:t>
+              <a:t>5/27/21</a:t>
             </a:fld>
             <a:endParaRPr lang="en-US"/>
           </a:p>
@@ -1299,7 +1299,7 @@
           <a:p>
             <a:fld id="{9FE185F7-9B28-9F45-9F43-9CB5A0B99390}" type="datetimeFigureOut">
               <a:rPr lang="en-US" smtClean="0"/>
-              <a:t>9/10/20</a:t>
+              <a:t>5/27/21</a:t>
             </a:fld>
             <a:endParaRPr lang="en-US"/>
           </a:p>
@@ -1574,7 +1574,7 @@
           <a:p>
             <a:fld id="{9FE185F7-9B28-9F45-9F43-9CB5A0B99390}" type="datetimeFigureOut">
               <a:rPr lang="en-US" smtClean="0"/>
-              <a:t>9/10/20</a:t>
+              <a:t>5/27/21</a:t>
             </a:fld>
             <a:endParaRPr lang="en-US"/>
           </a:p>
@@ -1839,7 +1839,7 @@
           <a:p>
             <a:fld id="{9FE185F7-9B28-9F45-9F43-9CB5A0B99390}" type="datetimeFigureOut">
               <a:rPr lang="en-US" smtClean="0"/>
-              <a:t>9/10/20</a:t>
+              <a:t>5/27/21</a:t>
             </a:fld>
             <a:endParaRPr lang="en-US"/>
           </a:p>
@@ -2251,7 +2251,7 @@
           <a:p>
             <a:fld id="{9FE185F7-9B28-9F45-9F43-9CB5A0B99390}" type="datetimeFigureOut">
               <a:rPr lang="en-US" smtClean="0"/>
-              <a:t>9/10/20</a:t>
+              <a:t>5/27/21</a:t>
             </a:fld>
             <a:endParaRPr lang="en-US"/>
           </a:p>
@@ -2392,7 +2392,7 @@
           <a:p>
             <a:fld id="{9FE185F7-9B28-9F45-9F43-9CB5A0B99390}" type="datetimeFigureOut">
               <a:rPr lang="en-US" smtClean="0"/>
-              <a:t>9/10/20</a:t>
+              <a:t>5/27/21</a:t>
             </a:fld>
             <a:endParaRPr lang="en-US"/>
           </a:p>
@@ -2505,7 +2505,7 @@
           <a:p>
             <a:fld id="{9FE185F7-9B28-9F45-9F43-9CB5A0B99390}" type="datetimeFigureOut">
               <a:rPr lang="en-US" smtClean="0"/>
-              <a:t>9/10/20</a:t>
+              <a:t>5/27/21</a:t>
             </a:fld>
             <a:endParaRPr lang="en-US"/>
           </a:p>
@@ -2816,7 +2816,7 @@
           <a:p>
             <a:fld id="{9FE185F7-9B28-9F45-9F43-9CB5A0B99390}" type="datetimeFigureOut">
               <a:rPr lang="en-US" smtClean="0"/>
-              <a:t>9/10/20</a:t>
+              <a:t>5/27/21</a:t>
             </a:fld>
             <a:endParaRPr lang="en-US"/>
           </a:p>
@@ -3104,7 +3104,7 @@
           <a:p>
             <a:fld id="{9FE185F7-9B28-9F45-9F43-9CB5A0B99390}" type="datetimeFigureOut">
               <a:rPr lang="en-US" smtClean="0"/>
-              <a:t>9/10/20</a:t>
+              <a:t>5/27/21</a:t>
             </a:fld>
             <a:endParaRPr lang="en-US"/>
           </a:p>
@@ -3345,7 +3345,7 @@
           <a:p>
             <a:fld id="{9FE185F7-9B28-9F45-9F43-9CB5A0B99390}" type="datetimeFigureOut">
               <a:rPr lang="en-US" smtClean="0"/>
-              <a:t>9/10/20</a:t>
+              <a:t>5/27/21</a:t>
             </a:fld>
             <a:endParaRPr lang="en-US"/>
           </a:p>
@@ -3782,11 +3782,7 @@
           <a:prstGeom prst="rect">
             <a:avLst/>
           </a:prstGeom>
-          <a:solidFill>
-            <a:srgbClr val="5A6B86">
-              <a:alpha val="9804"/>
-            </a:srgbClr>
-          </a:solidFill>
+          <a:noFill/>
           <a:ln w="12700">
             <a:solidFill>
               <a:srgbClr val="002060"/>
@@ -4050,11 +4046,7 @@
           <a:prstGeom prst="rect">
             <a:avLst/>
           </a:prstGeom>
-          <a:solidFill>
-            <a:srgbClr val="5A6B86">
-              <a:alpha val="9804"/>
-            </a:srgbClr>
-          </a:solidFill>
+          <a:noFill/>
           <a:ln w="12700">
             <a:solidFill>
               <a:srgbClr val="002060"/>
@@ -4130,11 +4122,7 @@
           <a:prstGeom prst="rect">
             <a:avLst/>
           </a:prstGeom>
-          <a:solidFill>
-            <a:srgbClr val="5A6B86">
-              <a:alpha val="9804"/>
-            </a:srgbClr>
-          </a:solidFill>
+          <a:noFill/>
           <a:ln w="12700">
             <a:solidFill>
               <a:schemeClr val="tx1"/>
@@ -5719,11 +5707,7 @@
           <a:prstGeom prst="rect">
             <a:avLst/>
           </a:prstGeom>
-          <a:solidFill>
-            <a:srgbClr val="5A6B86">
-              <a:alpha val="9804"/>
-            </a:srgbClr>
-          </a:solidFill>
+          <a:noFill/>
           <a:ln w="12700">
             <a:solidFill>
               <a:schemeClr val="tx1"/>

</xml_diff>